<commit_message>
moved test code to run_program file from file_manipulatory
</commit_message>
<xml_diff>
--- a/tools/PPTX_TEMPLATE.pptx
+++ b/tools/PPTX_TEMPLATE.pptx
@@ -209,7 +209,7 @@
           <a:p>
             <a:fld id="{15B67AEC-DA78-4123-B070-31741467CEA0}" type="datetimeFigureOut">
               <a:rPr lang="en-US" smtClean="0"/>
-              <a:t>8/22/2017</a:t>
+              <a:t>8/23/2017</a:t>
             </a:fld>
             <a:endParaRPr lang="en-US"/>
           </a:p>
@@ -580,8 +580,8 @@
         </p:nvSpPr>
         <p:spPr>
           <a:xfrm>
-            <a:off x="2710832" y="987425"/>
-            <a:ext cx="9257331" cy="5368930"/>
+            <a:off x="2710832" y="961547"/>
+            <a:ext cx="9144000" cy="5394960"/>
           </a:xfrm>
         </p:spPr>
         <p:txBody>
@@ -604,8 +604,8 @@
         </p:nvSpPr>
         <p:spPr>
           <a:xfrm>
-            <a:off x="695325" y="4313238"/>
-            <a:ext cx="1635125" cy="1643062"/>
+            <a:off x="264003" y="4356370"/>
+            <a:ext cx="2176272" cy="1517904"/>
           </a:xfrm>
         </p:spPr>
         <p:txBody>

</xml_diff>